<commit_message>
added message converter for mqtt
</commit_message>
<xml_diff>
--- a/architecture_1.pptx
+++ b/architecture_1.pptx
@@ -3370,7 +3370,7 @@
         </p:blipFill>
         <p:spPr>
           <a:xfrm>
-            <a:off x="0" y="0"/>
+            <a:off x="-14867" y="0"/>
             <a:ext cx="12192000" cy="5394508"/>
           </a:xfrm>
           <a:prstGeom prst="rect">
@@ -3444,7 +3444,7 @@
         </p:nvSpPr>
         <p:spPr>
           <a:xfrm>
-            <a:off x="2266065" y="1980173"/>
+            <a:off x="2243489" y="1980173"/>
             <a:ext cx="1639229" cy="406193"/>
           </a:xfrm>
           <a:prstGeom prst="rect">
@@ -3586,7 +3586,7 @@
         </p:nvSpPr>
         <p:spPr>
           <a:xfrm>
-            <a:off x="3343176" y="77946"/>
+            <a:off x="3382087" y="51736"/>
             <a:ext cx="2058081" cy="561177"/>
           </a:xfrm>
           <a:prstGeom prst="rect">
@@ -3623,14 +3623,14 @@
           <a:p>
             <a:pPr algn="ctr"/>
             <a:r>
-              <a:rPr lang="en-US" sz="2000" b="1" dirty="0"/>
+              <a:rPr lang="en-US" sz="2000" b="1" i="1" dirty="0"/>
               <a:t>./</a:t>
             </a:r>
             <a:r>
-              <a:rPr lang="en-US" sz="2000" b="1" dirty="0" err="1"/>
+              <a:rPr lang="en-US" sz="2000" b="1" i="1" dirty="0" err="1"/>
               <a:t>mqttToMongo</a:t>
             </a:r>
-            <a:endParaRPr lang="en-US" sz="2000" b="1" dirty="0"/>
+            <a:endParaRPr lang="en-US" sz="2000" b="1" i="1" dirty="0"/>
           </a:p>
         </p:txBody>
       </p:sp>
@@ -3649,7 +3649,7 @@
         <p:spPr>
           <a:xfrm>
             <a:off x="7846276" y="1875010"/>
-            <a:ext cx="1765604" cy="307777"/>
+            <a:ext cx="1765604" cy="276999"/>
           </a:xfrm>
           <a:prstGeom prst="rect">
             <a:avLst/>
@@ -3664,7 +3664,7 @@
           <a:p>
             <a:pPr algn="ctr"/>
             <a:r>
-              <a:rPr lang="en-US" sz="1400" i="1" dirty="0"/>
+              <a:rPr lang="en-US" sz="1200" i="1" dirty="0"/>
               <a:t>read data from DB </a:t>
             </a:r>
           </a:p>
@@ -3721,7 +3721,7 @@
         <p:spPr>
           <a:xfrm>
             <a:off x="8008433" y="4272517"/>
-            <a:ext cx="1867829" cy="307777"/>
+            <a:ext cx="1867829" cy="276999"/>
           </a:xfrm>
           <a:prstGeom prst="rect">
             <a:avLst/>
@@ -3736,14 +3736,14 @@
           <a:p>
             <a:pPr algn="ctr"/>
             <a:r>
-              <a:rPr lang="en-US" sz="1400" i="1" dirty="0"/>
+              <a:rPr lang="en-US" sz="1200" i="1" dirty="0"/>
               <a:t>import in </a:t>
             </a:r>
             <a:r>
-              <a:rPr lang="en-US" sz="1400" i="1" dirty="0" err="1"/>
+              <a:rPr lang="en-US" sz="1200" i="1" dirty="0" err="1"/>
               <a:t>Cytoscape</a:t>
             </a:r>
-            <a:endParaRPr lang="en-US" sz="1400" i="1" dirty="0"/>
+            <a:endParaRPr lang="en-US" sz="1200" i="1" dirty="0"/>
           </a:p>
         </p:txBody>
       </p:sp>
@@ -4096,8 +4096,8 @@
         </p:blipFill>
         <p:spPr>
           <a:xfrm>
-            <a:off x="5324242" y="5647639"/>
-            <a:ext cx="2522034" cy="1136160"/>
+            <a:off x="5324241" y="5574588"/>
+            <a:ext cx="2684191" cy="1209211"/>
           </a:xfrm>
           <a:prstGeom prst="rect">
             <a:avLst/>
@@ -4202,7 +4202,7 @@
           <a:p>
             <a:pPr algn="ctr"/>
             <a:r>
-              <a:rPr lang="en-US" b="1" dirty="0"/>
+              <a:rPr lang="en-US" b="1" i="1" dirty="0"/>
               <a:t>Integration.js</a:t>
             </a:r>
           </a:p>
@@ -4222,8 +4222,8 @@
         </p:nvSpPr>
         <p:spPr>
           <a:xfrm>
-            <a:off x="3920162" y="1893518"/>
-            <a:ext cx="1663220" cy="561177"/>
+            <a:off x="3905956" y="1893518"/>
+            <a:ext cx="1677425" cy="561177"/>
           </a:xfrm>
           <a:prstGeom prst="rect">
             <a:avLst/>
@@ -4274,7 +4274,7 @@
         </p:nvSpPr>
         <p:spPr>
           <a:xfrm>
-            <a:off x="2238352" y="1855846"/>
+            <a:off x="2227064" y="1855846"/>
             <a:ext cx="1668629" cy="222336"/>
           </a:xfrm>
           <a:prstGeom prst="rect">
@@ -4328,8 +4328,8 @@
         </p:nvSpPr>
         <p:spPr>
           <a:xfrm rot="3398170">
-            <a:off x="4381450" y="1151316"/>
-            <a:ext cx="1538867" cy="307777"/>
+            <a:off x="4381450" y="1166705"/>
+            <a:ext cx="1538867" cy="276999"/>
           </a:xfrm>
           <a:prstGeom prst="rect">
             <a:avLst/>
@@ -4344,7 +4344,7 @@
           <a:p>
             <a:pPr algn="ctr"/>
             <a:r>
-              <a:rPr lang="en-US" sz="1400" i="1" dirty="0"/>
+              <a:rPr lang="en-US" sz="1200" i="1" dirty="0"/>
               <a:t>send data to DB </a:t>
             </a:r>
           </a:p>
@@ -4363,9 +4363,9 @@
           <p:nvPr/>
         </p:nvSpPr>
         <p:spPr>
-          <a:xfrm rot="18465402">
-            <a:off x="2884710" y="1145907"/>
-            <a:ext cx="1538867" cy="215444"/>
+          <a:xfrm rot="18656879">
+            <a:off x="2930963" y="1146594"/>
+            <a:ext cx="1616973" cy="184666"/>
           </a:xfrm>
           <a:prstGeom prst="rect">
             <a:avLst/>
@@ -4380,8 +4380,16 @@
           <a:p>
             <a:pPr algn="ctr"/>
             <a:r>
-              <a:rPr lang="en-US" sz="1400" i="1" dirty="0"/>
-              <a:t>subscribe to topic</a:t>
+              <a:rPr lang="en-US" sz="1200" i="1" dirty="0"/>
+              <a:t>subscribe to </a:t>
+            </a:r>
+            <a:r>
+              <a:rPr lang="en-US" sz="1200" i="1" dirty="0">
+                <a:solidFill>
+                  <a:srgbClr val="0D97FF"/>
+                </a:solidFill>
+              </a:rPr>
+              <a:t>/converted/</a:t>
             </a:r>
           </a:p>
         </p:txBody>
@@ -4395,13 +4403,15 @@
               </a:ext>
             </a:extLst>
           </p:cNvPr>
-          <p:cNvCxnSpPr/>
+          <p:cNvCxnSpPr>
+            <a:cxnSpLocks/>
+          </p:cNvCxnSpPr>
           <p:nvPr/>
         </p:nvCxnSpPr>
         <p:spPr>
           <a:xfrm flipV="1">
-            <a:off x="3343175" y="648851"/>
-            <a:ext cx="947519" cy="1206995"/>
+            <a:off x="3343175" y="624532"/>
+            <a:ext cx="1067952" cy="1231315"/>
           </a:xfrm>
           <a:prstGeom prst="straightConnector1">
             <a:avLst/>
@@ -4446,7 +4456,7 @@
         <p:spPr>
           <a:xfrm>
             <a:off x="4577307" y="648851"/>
-            <a:ext cx="1006075" cy="1525256"/>
+            <a:ext cx="1006074" cy="1525256"/>
           </a:xfrm>
           <a:prstGeom prst="straightConnector1">
             <a:avLst/>
@@ -4473,6 +4483,358 @@
           </a:fontRef>
         </p:style>
       </p:cxnSp>
+      <p:sp>
+        <p:nvSpPr>
+          <p:cNvPr id="31" name="Rechteck 30">
+            <a:extLst>
+              <a:ext uri="{FF2B5EF4-FFF2-40B4-BE49-F238E27FC236}">
+                <a16:creationId xmlns:a16="http://schemas.microsoft.com/office/drawing/2014/main" id="{93F73642-4F42-4B2D-BDBF-65F8451D61B9}"/>
+              </a:ext>
+            </a:extLst>
+          </p:cNvPr>
+          <p:cNvSpPr/>
+          <p:nvPr/>
+        </p:nvSpPr>
+        <p:spPr>
+          <a:xfrm>
+            <a:off x="3382087" y="3226922"/>
+            <a:ext cx="2058081" cy="561177"/>
+          </a:xfrm>
+          <a:prstGeom prst="rect">
+            <a:avLst/>
+          </a:prstGeom>
+          <a:solidFill>
+            <a:srgbClr val="00B050"/>
+          </a:solidFill>
+          <a:ln>
+            <a:solidFill>
+              <a:schemeClr val="tx1"/>
+            </a:solidFill>
+          </a:ln>
+        </p:spPr>
+        <p:style>
+          <a:lnRef idx="2">
+            <a:schemeClr val="accent1">
+              <a:shade val="50000"/>
+            </a:schemeClr>
+          </a:lnRef>
+          <a:fillRef idx="1">
+            <a:schemeClr val="accent1"/>
+          </a:fillRef>
+          <a:effectRef idx="0">
+            <a:schemeClr val="accent1"/>
+          </a:effectRef>
+          <a:fontRef idx="minor">
+            <a:schemeClr val="lt1"/>
+          </a:fontRef>
+        </p:style>
+        <p:txBody>
+          <a:bodyPr rtlCol="0" anchor="ctr"/>
+          <a:lstStyle/>
+          <a:p>
+            <a:pPr algn="ctr"/>
+            <a:r>
+              <a:rPr lang="en-US" sz="2000" b="1" i="1" dirty="0"/>
+              <a:t>msg_converter.js</a:t>
+            </a:r>
+          </a:p>
+        </p:txBody>
+      </p:sp>
+      <p:sp>
+        <p:nvSpPr>
+          <p:cNvPr id="7" name="Freihandform: Form 6">
+            <a:extLst>
+              <a:ext uri="{FF2B5EF4-FFF2-40B4-BE49-F238E27FC236}">
+                <a16:creationId xmlns:a16="http://schemas.microsoft.com/office/drawing/2014/main" id="{C5FDC195-5609-4135-9CCA-AC8AA739CE3E}"/>
+              </a:ext>
+            </a:extLst>
+          </p:cNvPr>
+          <p:cNvSpPr/>
+          <p:nvPr/>
+        </p:nvSpPr>
+        <p:spPr>
+          <a:xfrm>
+            <a:off x="3266654" y="2490281"/>
+            <a:ext cx="206571" cy="690664"/>
+          </a:xfrm>
+          <a:custGeom>
+            <a:avLst/>
+            <a:gdLst>
+              <a:gd name="connsiteX0" fmla="*/ 185190 w 185190"/>
+              <a:gd name="connsiteY0" fmla="*/ 0 h 690664"/>
+              <a:gd name="connsiteX1" fmla="*/ 364 w 185190"/>
+              <a:gd name="connsiteY1" fmla="*/ 252919 h 690664"/>
+              <a:gd name="connsiteX2" fmla="*/ 136551 w 185190"/>
+              <a:gd name="connsiteY2" fmla="*/ 690664 h 690664"/>
+              <a:gd name="connsiteX0" fmla="*/ 163828 w 163828"/>
+              <a:gd name="connsiteY0" fmla="*/ 0 h 690664"/>
+              <a:gd name="connsiteX1" fmla="*/ 433 w 163828"/>
+              <a:gd name="connsiteY1" fmla="*/ 410081 h 690664"/>
+              <a:gd name="connsiteX2" fmla="*/ 115189 w 163828"/>
+              <a:gd name="connsiteY2" fmla="*/ 690664 h 690664"/>
+              <a:gd name="connsiteX0" fmla="*/ 185190 w 185190"/>
+              <a:gd name="connsiteY0" fmla="*/ 0 h 690664"/>
+              <a:gd name="connsiteX1" fmla="*/ 364 w 185190"/>
+              <a:gd name="connsiteY1" fmla="*/ 302924 h 690664"/>
+              <a:gd name="connsiteX2" fmla="*/ 136551 w 185190"/>
+              <a:gd name="connsiteY2" fmla="*/ 690664 h 690664"/>
+              <a:gd name="connsiteX0" fmla="*/ 206571 w 206571"/>
+              <a:gd name="connsiteY0" fmla="*/ 0 h 690664"/>
+              <a:gd name="connsiteX1" fmla="*/ 314 w 206571"/>
+              <a:gd name="connsiteY1" fmla="*/ 345787 h 690664"/>
+              <a:gd name="connsiteX2" fmla="*/ 157932 w 206571"/>
+              <a:gd name="connsiteY2" fmla="*/ 690664 h 690664"/>
+              <a:gd name="connsiteX0" fmla="*/ 206571 w 206571"/>
+              <a:gd name="connsiteY0" fmla="*/ 0 h 690664"/>
+              <a:gd name="connsiteX1" fmla="*/ 314 w 206571"/>
+              <a:gd name="connsiteY1" fmla="*/ 310069 h 690664"/>
+              <a:gd name="connsiteX2" fmla="*/ 157932 w 206571"/>
+              <a:gd name="connsiteY2" fmla="*/ 690664 h 690664"/>
+            </a:gdLst>
+            <a:ahLst/>
+            <a:cxnLst>
+              <a:cxn ang="0">
+                <a:pos x="connsiteX0" y="connsiteY0"/>
+              </a:cxn>
+              <a:cxn ang="0">
+                <a:pos x="connsiteX1" y="connsiteY1"/>
+              </a:cxn>
+              <a:cxn ang="0">
+                <a:pos x="connsiteX2" y="connsiteY2"/>
+              </a:cxn>
+            </a:cxnLst>
+            <a:rect l="l" t="t" r="r" b="b"/>
+            <a:pathLst>
+              <a:path w="206571" h="690664">
+                <a:moveTo>
+                  <a:pt x="206571" y="0"/>
+                </a:moveTo>
+                <a:cubicBezTo>
+                  <a:pt x="118211" y="68904"/>
+                  <a:pt x="8420" y="194958"/>
+                  <a:pt x="314" y="310069"/>
+                </a:cubicBezTo>
+                <a:cubicBezTo>
+                  <a:pt x="-7793" y="425180"/>
+                  <a:pt x="143340" y="645268"/>
+                  <a:pt x="157932" y="690664"/>
+                </a:cubicBezTo>
+              </a:path>
+            </a:pathLst>
+          </a:custGeom>
+          <a:ln w="22225">
+            <a:tailEnd type="triangle"/>
+          </a:ln>
+        </p:spPr>
+        <p:style>
+          <a:lnRef idx="1">
+            <a:schemeClr val="dk1"/>
+          </a:lnRef>
+          <a:fillRef idx="0">
+            <a:schemeClr val="dk1"/>
+          </a:fillRef>
+          <a:effectRef idx="0">
+            <a:schemeClr val="dk1"/>
+          </a:effectRef>
+          <a:fontRef idx="minor">
+            <a:schemeClr val="tx1"/>
+          </a:fontRef>
+        </p:style>
+        <p:txBody>
+          <a:bodyPr rtlCol="0" anchor="ctr"/>
+          <a:lstStyle/>
+          <a:p>
+            <a:pPr algn="ctr"/>
+            <a:endParaRPr lang="en-US" dirty="0"/>
+          </a:p>
+        </p:txBody>
+      </p:sp>
+      <p:sp>
+        <p:nvSpPr>
+          <p:cNvPr id="32" name="Freihandform: Form 31">
+            <a:extLst>
+              <a:ext uri="{FF2B5EF4-FFF2-40B4-BE49-F238E27FC236}">
+                <a16:creationId xmlns:a16="http://schemas.microsoft.com/office/drawing/2014/main" id="{8289D9BC-E3F7-4CDB-9DFA-131B39E520A9}"/>
+              </a:ext>
+            </a:extLst>
+          </p:cNvPr>
+          <p:cNvSpPr/>
+          <p:nvPr/>
+        </p:nvSpPr>
+        <p:spPr>
+          <a:xfrm flipH="1">
+            <a:off x="3539650" y="2490281"/>
+            <a:ext cx="206571" cy="690664"/>
+          </a:xfrm>
+          <a:custGeom>
+            <a:avLst/>
+            <a:gdLst>
+              <a:gd name="connsiteX0" fmla="*/ 185190 w 185190"/>
+              <a:gd name="connsiteY0" fmla="*/ 0 h 690664"/>
+              <a:gd name="connsiteX1" fmla="*/ 364 w 185190"/>
+              <a:gd name="connsiteY1" fmla="*/ 252919 h 690664"/>
+              <a:gd name="connsiteX2" fmla="*/ 136551 w 185190"/>
+              <a:gd name="connsiteY2" fmla="*/ 690664 h 690664"/>
+              <a:gd name="connsiteX0" fmla="*/ 163828 w 163828"/>
+              <a:gd name="connsiteY0" fmla="*/ 0 h 690664"/>
+              <a:gd name="connsiteX1" fmla="*/ 433 w 163828"/>
+              <a:gd name="connsiteY1" fmla="*/ 410081 h 690664"/>
+              <a:gd name="connsiteX2" fmla="*/ 115189 w 163828"/>
+              <a:gd name="connsiteY2" fmla="*/ 690664 h 690664"/>
+              <a:gd name="connsiteX0" fmla="*/ 185190 w 185190"/>
+              <a:gd name="connsiteY0" fmla="*/ 0 h 690664"/>
+              <a:gd name="connsiteX1" fmla="*/ 364 w 185190"/>
+              <a:gd name="connsiteY1" fmla="*/ 302924 h 690664"/>
+              <a:gd name="connsiteX2" fmla="*/ 136551 w 185190"/>
+              <a:gd name="connsiteY2" fmla="*/ 690664 h 690664"/>
+              <a:gd name="connsiteX0" fmla="*/ 206571 w 206571"/>
+              <a:gd name="connsiteY0" fmla="*/ 0 h 690664"/>
+              <a:gd name="connsiteX1" fmla="*/ 314 w 206571"/>
+              <a:gd name="connsiteY1" fmla="*/ 345787 h 690664"/>
+              <a:gd name="connsiteX2" fmla="*/ 157932 w 206571"/>
+              <a:gd name="connsiteY2" fmla="*/ 690664 h 690664"/>
+              <a:gd name="connsiteX0" fmla="*/ 206571 w 206571"/>
+              <a:gd name="connsiteY0" fmla="*/ 0 h 690664"/>
+              <a:gd name="connsiteX1" fmla="*/ 314 w 206571"/>
+              <a:gd name="connsiteY1" fmla="*/ 310069 h 690664"/>
+              <a:gd name="connsiteX2" fmla="*/ 157932 w 206571"/>
+              <a:gd name="connsiteY2" fmla="*/ 690664 h 690664"/>
+            </a:gdLst>
+            <a:ahLst/>
+            <a:cxnLst>
+              <a:cxn ang="0">
+                <a:pos x="connsiteX0" y="connsiteY0"/>
+              </a:cxn>
+              <a:cxn ang="0">
+                <a:pos x="connsiteX1" y="connsiteY1"/>
+              </a:cxn>
+              <a:cxn ang="0">
+                <a:pos x="connsiteX2" y="connsiteY2"/>
+              </a:cxn>
+            </a:cxnLst>
+            <a:rect l="l" t="t" r="r" b="b"/>
+            <a:pathLst>
+              <a:path w="206571" h="690664">
+                <a:moveTo>
+                  <a:pt x="206571" y="0"/>
+                </a:moveTo>
+                <a:cubicBezTo>
+                  <a:pt x="118211" y="68904"/>
+                  <a:pt x="8420" y="194958"/>
+                  <a:pt x="314" y="310069"/>
+                </a:cubicBezTo>
+                <a:cubicBezTo>
+                  <a:pt x="-7793" y="425180"/>
+                  <a:pt x="143340" y="645268"/>
+                  <a:pt x="157932" y="690664"/>
+                </a:cubicBezTo>
+              </a:path>
+            </a:pathLst>
+          </a:custGeom>
+          <a:ln w="22225">
+            <a:headEnd type="triangle"/>
+            <a:tailEnd type="none"/>
+          </a:ln>
+        </p:spPr>
+        <p:style>
+          <a:lnRef idx="1">
+            <a:schemeClr val="dk1"/>
+          </a:lnRef>
+          <a:fillRef idx="0">
+            <a:schemeClr val="dk1"/>
+          </a:fillRef>
+          <a:effectRef idx="0">
+            <a:schemeClr val="dk1"/>
+          </a:effectRef>
+          <a:fontRef idx="minor">
+            <a:schemeClr val="tx1"/>
+          </a:fontRef>
+        </p:style>
+        <p:txBody>
+          <a:bodyPr rtlCol="0" anchor="ctr"/>
+          <a:lstStyle/>
+          <a:p>
+            <a:pPr algn="ctr"/>
+            <a:endParaRPr lang="en-US" dirty="0"/>
+          </a:p>
+        </p:txBody>
+      </p:sp>
+      <p:sp>
+        <p:nvSpPr>
+          <p:cNvPr id="33" name="Textfeld 32">
+            <a:extLst>
+              <a:ext uri="{FF2B5EF4-FFF2-40B4-BE49-F238E27FC236}">
+                <a16:creationId xmlns:a16="http://schemas.microsoft.com/office/drawing/2014/main" id="{8336A66D-E422-4B65-98E8-6D264DCF92F7}"/>
+              </a:ext>
+            </a:extLst>
+          </p:cNvPr>
+          <p:cNvSpPr txBox="1"/>
+          <p:nvPr/>
+        </p:nvSpPr>
+        <p:spPr>
+          <a:xfrm>
+            <a:off x="3670522" y="2576967"/>
+            <a:ext cx="3106056" cy="646331"/>
+          </a:xfrm>
+          <a:prstGeom prst="rect">
+            <a:avLst/>
+          </a:prstGeom>
+          <a:noFill/>
+        </p:spPr>
+        <p:txBody>
+          <a:bodyPr wrap="square" rtlCol="0">
+            <a:spAutoFit/>
+          </a:bodyPr>
+          <a:lstStyle/>
+          <a:p>
+            <a:pPr marL="171450" indent="-171450">
+              <a:buFont typeface="Arial" panose="020B0604020202020204" pitchFamily="34" charset="0"/>
+              <a:buChar char="•"/>
+            </a:pPr>
+            <a:r>
+              <a:rPr lang="en-US" sz="1200" i="1" dirty="0"/>
+              <a:t>Subscribe to /</a:t>
+            </a:r>
+            <a:r>
+              <a:rPr lang="en-US" sz="1200" i="1" dirty="0" err="1"/>
+              <a:t>camflow</a:t>
+            </a:r>
+            <a:r>
+              <a:rPr lang="en-US" sz="1200" i="1" dirty="0"/>
+              <a:t>/provenance/</a:t>
+            </a:r>
+          </a:p>
+          <a:p>
+            <a:pPr marL="171450" indent="-171450">
+              <a:buFont typeface="Arial" panose="020B0604020202020204" pitchFamily="34" charset="0"/>
+              <a:buChar char="•"/>
+            </a:pPr>
+            <a:r>
+              <a:rPr lang="en-US" sz="1200" i="1" dirty="0"/>
+              <a:t>Convert BASE64 to JSON string</a:t>
+            </a:r>
+          </a:p>
+          <a:p>
+            <a:pPr marL="171450" indent="-171450">
+              <a:buFont typeface="Arial" panose="020B0604020202020204" pitchFamily="34" charset="0"/>
+              <a:buChar char="•"/>
+            </a:pPr>
+            <a:r>
+              <a:rPr lang="en-US" sz="1200" i="1" dirty="0"/>
+              <a:t>Publish to </a:t>
+            </a:r>
+            <a:r>
+              <a:rPr lang="en-US" sz="1200" i="1" dirty="0">
+                <a:solidFill>
+                  <a:srgbClr val="0D97FF"/>
+                </a:solidFill>
+              </a:rPr>
+              <a:t>/converted/</a:t>
+            </a:r>
+            <a:endParaRPr lang="en-US" sz="1200" i="1" dirty="0"/>
+          </a:p>
+        </p:txBody>
+      </p:sp>
     </p:spTree>
     <p:extLst>
       <p:ext uri="{BB962C8B-B14F-4D97-AF65-F5344CB8AC3E}">

</xml_diff>